<commit_message>
Bearbeitung Präsi Task 14
</commit_message>
<xml_diff>
--- a/doc/CS1/Task14/Final_Presentation_CS1_Task_14_Blau.pptx
+++ b/doc/CS1/Task14/Final_Presentation_CS1_Task_14_Blau.pptx
@@ -5,15 +5,20 @@
     <p:sldMasterId id="2147483669" r:id="rId4"/>
   </p:sldMasterIdLst>
   <p:notesMasterIdLst>
-    <p:notesMasterId r:id="rId11"/>
+    <p:notesMasterId r:id="rId16"/>
   </p:notesMasterIdLst>
   <p:sldIdLst>
     <p:sldId id="256" r:id="rId5"/>
     <p:sldId id="258" r:id="rId6"/>
     <p:sldId id="267" r:id="rId7"/>
-    <p:sldId id="260" r:id="rId8"/>
-    <p:sldId id="266" r:id="rId9"/>
-    <p:sldId id="259" r:id="rId10"/>
+    <p:sldId id="272" r:id="rId8"/>
+    <p:sldId id="269" r:id="rId9"/>
+    <p:sldId id="270" r:id="rId10"/>
+    <p:sldId id="271" r:id="rId11"/>
+    <p:sldId id="273" r:id="rId12"/>
+    <p:sldId id="260" r:id="rId13"/>
+    <p:sldId id="266" r:id="rId14"/>
+    <p:sldId id="259" r:id="rId15"/>
   </p:sldIdLst>
   <p:sldSz cx="12207875" cy="6858000"/>
   <p:notesSz cx="6797675" cy="9872663"/>
@@ -144,7 +149,7 @@
   </p:defaultTextStyle>
   <p:extLst>
     <p:ext uri="{EFAFB233-063F-42B5-8137-9DF3F51BA10A}">
-      <p15:sldGuideLst xmlns:p15="http://schemas.microsoft.com/office/powerpoint/2012/main" xmlns="">
+      <p15:sldGuideLst xmlns:p15="http://schemas.microsoft.com/office/powerpoint/2012/main">
         <p15:guide id="1" orient="horz" pos="2160">
           <p15:clr>
             <a:srgbClr val="A4A3A4"/>
@@ -842,17 +847,9 @@
             <a:br>
               <a:rPr lang="de-DE" noProof="0" dirty="0"/>
             </a:br>
-            <a:r>
-              <a:rPr lang="de-DE" noProof="0" dirty="0"/>
-              <a:t/>
-            </a:r>
             <a:br>
               <a:rPr lang="de-DE" noProof="0" dirty="0"/>
             </a:br>
-            <a:r>
-              <a:rPr lang="de-DE" noProof="0" dirty="0"/>
-              <a:t/>
-            </a:r>
             <a:br>
               <a:rPr lang="de-DE" noProof="0" dirty="0"/>
             </a:br>
@@ -6820,6 +6817,436 @@
 </p:sld>
 </file>
 
+<file path=ppt/slides/slide10.xml><?xml version="1.0" encoding="utf-8"?>
+<p:sld xmlns:a="http://schemas.openxmlformats.org/drawingml/2006/main" xmlns:r="http://schemas.openxmlformats.org/officeDocument/2006/relationships" xmlns:p="http://schemas.openxmlformats.org/presentationml/2006/main">
+  <p:cSld>
+    <p:spTree>
+      <p:nvGrpSpPr>
+        <p:cNvPr id="1" name=""/>
+        <p:cNvGrpSpPr/>
+        <p:nvPr/>
+      </p:nvGrpSpPr>
+      <p:grpSpPr>
+        <a:xfrm>
+          <a:off x="0" y="0"/>
+          <a:ext cx="0" cy="0"/>
+          <a:chOff x="0" y="0"/>
+          <a:chExt cx="0" cy="0"/>
+        </a:xfrm>
+      </p:grpSpPr>
+      <p:sp>
+        <p:nvSpPr>
+          <p:cNvPr id="10242" name="Inhaltsplatzhalter 1"/>
+          <p:cNvSpPr>
+            <a:spLocks noGrp="1"/>
+          </p:cNvSpPr>
+          <p:nvPr>
+            <p:ph sz="half" idx="1"/>
+          </p:nvPr>
+        </p:nvSpPr>
+        <p:spPr bwMode="auto">
+          <a:xfrm>
+            <a:off x="457200" y="1331913"/>
+            <a:ext cx="11249025" cy="4787900"/>
+          </a:xfrm>
+          <a:noFill/>
+          <a:extLst>
+            <a:ext uri="{909E8E84-426E-40DD-AFC4-6F175D3DCCD1}">
+              <a14:hiddenFill xmlns:a14="http://schemas.microsoft.com/office/drawing/2010/main">
+                <a:solidFill>
+                  <a:srgbClr val="FFFFFF"/>
+                </a:solidFill>
+              </a14:hiddenFill>
+            </a:ext>
+            <a:ext uri="{91240B29-F687-4F45-9708-019B960494DF}">
+              <a14:hiddenLine xmlns:a14="http://schemas.microsoft.com/office/drawing/2010/main" w="9525">
+                <a:solidFill>
+                  <a:srgbClr val="000000"/>
+                </a:solidFill>
+                <a:miter lim="800000"/>
+                <a:headEnd/>
+                <a:tailEnd/>
+              </a14:hiddenLine>
+            </a:ext>
+          </a:extLst>
+        </p:spPr>
+        <p:txBody>
+          <a:bodyPr vert="horz" wrap="square" tIns="45720" bIns="45720" numCol="1" anchor="t" anchorCtr="0" compatLnSpc="1">
+            <a:prstTxWarp prst="textNoShape">
+              <a:avLst/>
+            </a:prstTxWarp>
+          </a:bodyPr>
+          <a:lstStyle/>
+          <a:p>
+            <a:pPr eaLnBrk="1" hangingPunct="1">
+              <a:buFont typeface="Lucida Grande" charset="0"/>
+              <a:buChar char="▶"/>
+            </a:pPr>
+            <a:r>
+              <a:rPr lang="de-CH" dirty="0">
+                <a:latin typeface="Lucida Sans" pitchFamily="34" charset="0"/>
+              </a:rPr>
+              <a:t>Kommunikation wichtig </a:t>
+            </a:r>
+          </a:p>
+          <a:p>
+            <a:pPr eaLnBrk="1" hangingPunct="1">
+              <a:buFont typeface="Lucida Grande" charset="0"/>
+              <a:buChar char="▶"/>
+            </a:pPr>
+            <a:r>
+              <a:rPr lang="de-CH" dirty="0" err="1">
+                <a:latin typeface="Lucida Sans" pitchFamily="34" charset="0"/>
+              </a:rPr>
+              <a:t>Designthinking</a:t>
+            </a:r>
+            <a:r>
+              <a:rPr lang="de-CH" dirty="0">
+                <a:latin typeface="Lucida Sans" pitchFamily="34" charset="0"/>
+              </a:rPr>
+              <a:t>-Phase </a:t>
+            </a:r>
+          </a:p>
+          <a:p>
+            <a:pPr>
+              <a:buFont typeface="Lucida Grande" charset="0"/>
+              <a:buChar char="▶"/>
+            </a:pPr>
+            <a:r>
+              <a:rPr lang="de-CH" dirty="0">
+                <a:latin typeface="Lucida Sans" pitchFamily="34" charset="0"/>
+              </a:rPr>
+              <a:t>Learning </a:t>
+            </a:r>
+            <a:r>
+              <a:rPr lang="de-CH" dirty="0" err="1">
+                <a:latin typeface="Lucida Sans" pitchFamily="34" charset="0"/>
+              </a:rPr>
+              <a:t>by</a:t>
+            </a:r>
+            <a:r>
+              <a:rPr lang="de-CH" dirty="0">
+                <a:latin typeface="Lucida Sans" pitchFamily="34" charset="0"/>
+              </a:rPr>
+              <a:t> </a:t>
+            </a:r>
+            <a:r>
+              <a:rPr lang="de-CH" dirty="0" err="1">
+                <a:latin typeface="Lucida Sans" pitchFamily="34" charset="0"/>
+              </a:rPr>
+              <a:t>doing</a:t>
+            </a:r>
+            <a:r>
+              <a:rPr lang="de-CH" dirty="0">
+                <a:latin typeface="Lucida Sans" pitchFamily="34" charset="0"/>
+              </a:rPr>
+              <a:t> </a:t>
+            </a:r>
+          </a:p>
+          <a:p>
+            <a:pPr eaLnBrk="1" hangingPunct="1">
+              <a:buFont typeface="Lucida Grande" charset="0"/>
+              <a:buChar char="▶"/>
+            </a:pPr>
+            <a:r>
+              <a:rPr lang="de-CH" dirty="0">
+                <a:latin typeface="Lucida Sans" pitchFamily="34" charset="0"/>
+              </a:rPr>
+              <a:t>Zuerst Klassen richtig definieren bevor Datenbank erstellen</a:t>
+            </a:r>
+          </a:p>
+          <a:p>
+            <a:pPr eaLnBrk="1" hangingPunct="1">
+              <a:buFont typeface="Lucida Grande" charset="0"/>
+              <a:buChar char="▶"/>
+            </a:pPr>
+            <a:r>
+              <a:rPr lang="de-CH" dirty="0">
+                <a:latin typeface="Lucida Sans" pitchFamily="34" charset="0"/>
+              </a:rPr>
+              <a:t>Aufgaben von Anfang an ernst nehmen </a:t>
+            </a:r>
+          </a:p>
+          <a:p>
+            <a:pPr eaLnBrk="1" hangingPunct="1">
+              <a:buFont typeface="Lucida Grande" charset="0"/>
+              <a:buChar char="▶"/>
+            </a:pPr>
+            <a:r>
+              <a:rPr lang="de-CH" dirty="0">
+                <a:latin typeface="Lucida Sans" pitchFamily="34" charset="0"/>
+              </a:rPr>
+              <a:t>Meetings effizienter gestallten </a:t>
+            </a:r>
+          </a:p>
+          <a:p>
+            <a:pPr eaLnBrk="1" hangingPunct="1">
+              <a:buFont typeface="Lucida Grande" charset="0"/>
+              <a:buChar char="▶"/>
+            </a:pPr>
+            <a:r>
+              <a:rPr lang="de-CH" dirty="0">
+                <a:latin typeface="Lucida Sans" pitchFamily="34" charset="0"/>
+              </a:rPr>
+              <a:t>Motivation</a:t>
+            </a:r>
+          </a:p>
+          <a:p>
+            <a:pPr eaLnBrk="1" hangingPunct="1">
+              <a:buFont typeface="Lucida Grande" charset="0"/>
+              <a:buChar char="▶"/>
+            </a:pPr>
+            <a:r>
+              <a:rPr lang="de-CH" dirty="0">
+                <a:latin typeface="Lucida Sans" pitchFamily="34" charset="0"/>
+              </a:rPr>
+              <a:t>Durchhaltevermögen</a:t>
+            </a:r>
+          </a:p>
+          <a:p>
+            <a:pPr eaLnBrk="1" hangingPunct="1">
+              <a:buFont typeface="Lucida Grande" charset="0"/>
+              <a:buChar char="▶"/>
+            </a:pPr>
+            <a:endParaRPr lang="de-CH" dirty="0">
+              <a:latin typeface="Lucida Sans" pitchFamily="34" charset="0"/>
+            </a:endParaRPr>
+          </a:p>
+          <a:p>
+            <a:pPr eaLnBrk="1" hangingPunct="1">
+              <a:buFont typeface="Lucida Grande" charset="0"/>
+              <a:buChar char="▶"/>
+            </a:pPr>
+            <a:endParaRPr lang="de-CH" dirty="0">
+              <a:latin typeface="Lucida Sans" pitchFamily="34" charset="0"/>
+            </a:endParaRPr>
+          </a:p>
+          <a:p>
+            <a:pPr eaLnBrk="1" hangingPunct="1">
+              <a:buFont typeface="Lucida Grande" charset="0"/>
+              <a:buChar char="▶"/>
+            </a:pPr>
+            <a:endParaRPr lang="de-CH" dirty="0">
+              <a:latin typeface="Lucida Sans" pitchFamily="34" charset="0"/>
+            </a:endParaRPr>
+          </a:p>
+          <a:p>
+            <a:pPr marL="0" indent="0" eaLnBrk="1" hangingPunct="1">
+              <a:buNone/>
+            </a:pPr>
+            <a:endParaRPr lang="de-CH" dirty="0">
+              <a:latin typeface="Lucida Sans" pitchFamily="34" charset="0"/>
+            </a:endParaRPr>
+          </a:p>
+          <a:p>
+            <a:pPr marL="0" indent="0" eaLnBrk="1" hangingPunct="1">
+              <a:buNone/>
+            </a:pPr>
+            <a:endParaRPr lang="de-CH" dirty="0">
+              <a:latin typeface="Lucida Sans" pitchFamily="34" charset="0"/>
+            </a:endParaRPr>
+          </a:p>
+        </p:txBody>
+      </p:sp>
+      <p:sp>
+        <p:nvSpPr>
+          <p:cNvPr id="10243" name="Titel 2"/>
+          <p:cNvSpPr>
+            <a:spLocks noGrp="1"/>
+          </p:cNvSpPr>
+          <p:nvPr>
+            <p:ph type="ctrTitle"/>
+          </p:nvPr>
+        </p:nvSpPr>
+        <p:spPr bwMode="auto">
+          <a:xfrm>
+            <a:off x="457200" y="360363"/>
+            <a:ext cx="11249025" cy="539750"/>
+          </a:xfrm>
+          <a:noFill/>
+          <a:extLst>
+            <a:ext uri="{909E8E84-426E-40DD-AFC4-6F175D3DCCD1}">
+              <a14:hiddenFill xmlns:a14="http://schemas.microsoft.com/office/drawing/2010/main">
+                <a:solidFill>
+                  <a:srgbClr val="FFFFFF"/>
+                </a:solidFill>
+              </a14:hiddenFill>
+            </a:ext>
+            <a:ext uri="{91240B29-F687-4F45-9708-019B960494DF}">
+              <a14:hiddenLine xmlns:a14="http://schemas.microsoft.com/office/drawing/2010/main" w="9525">
+                <a:solidFill>
+                  <a:srgbClr val="000000"/>
+                </a:solidFill>
+                <a:miter lim="800000"/>
+                <a:headEnd/>
+                <a:tailEnd/>
+              </a14:hiddenLine>
+            </a:ext>
+          </a:extLst>
+        </p:spPr>
+        <p:txBody>
+          <a:bodyPr vert="horz" wrap="square" tIns="45720" bIns="45720" numCol="1" anchor="t" anchorCtr="0" compatLnSpc="1">
+            <a:prstTxWarp prst="textNoShape">
+              <a:avLst/>
+            </a:prstTxWarp>
+          </a:bodyPr>
+          <a:lstStyle/>
+          <a:p>
+            <a:pPr eaLnBrk="1" hangingPunct="1"/>
+            <a:r>
+              <a:rPr lang="de-CH" dirty="0">
+                <a:latin typeface="Lucida Sans" pitchFamily="34" charset="0"/>
+              </a:rPr>
+              <a:t>Fazit</a:t>
+            </a:r>
+          </a:p>
+        </p:txBody>
+      </p:sp>
+    </p:spTree>
+    <p:extLst>
+      <p:ext uri="{BB962C8B-B14F-4D97-AF65-F5344CB8AC3E}">
+        <p14:creationId xmlns:p14="http://schemas.microsoft.com/office/powerpoint/2010/main" val="718703118"/>
+      </p:ext>
+    </p:extLst>
+  </p:cSld>
+  <p:clrMapOvr>
+    <a:masterClrMapping/>
+  </p:clrMapOvr>
+</p:sld>
+</file>
+
+<file path=ppt/slides/slide11.xml><?xml version="1.0" encoding="utf-8"?>
+<p:sld xmlns:a="http://schemas.openxmlformats.org/drawingml/2006/main" xmlns:r="http://schemas.openxmlformats.org/officeDocument/2006/relationships" xmlns:p="http://schemas.openxmlformats.org/presentationml/2006/main">
+  <p:cSld>
+    <p:spTree>
+      <p:nvGrpSpPr>
+        <p:cNvPr id="1" name=""/>
+        <p:cNvGrpSpPr/>
+        <p:nvPr/>
+      </p:nvGrpSpPr>
+      <p:grpSpPr>
+        <a:xfrm>
+          <a:off x="0" y="0"/>
+          <a:ext cx="0" cy="0"/>
+          <a:chOff x="0" y="0"/>
+          <a:chExt cx="0" cy="0"/>
+        </a:xfrm>
+      </p:grpSpPr>
+      <p:sp>
+        <p:nvSpPr>
+          <p:cNvPr id="8194" name="Titel 1"/>
+          <p:cNvSpPr>
+            <a:spLocks noGrp="1"/>
+          </p:cNvSpPr>
+          <p:nvPr>
+            <p:ph type="ctrTitle"/>
+          </p:nvPr>
+        </p:nvSpPr>
+        <p:spPr bwMode="auto">
+          <a:xfrm>
+            <a:off x="457200" y="1839913"/>
+            <a:ext cx="7019925" cy="533400"/>
+          </a:xfrm>
+          <a:noFill/>
+          <a:extLst>
+            <a:ext uri="{909E8E84-426E-40DD-AFC4-6F175D3DCCD1}">
+              <a14:hiddenFill xmlns:a14="http://schemas.microsoft.com/office/drawing/2010/main">
+                <a:solidFill>
+                  <a:srgbClr val="FFFFFF"/>
+                </a:solidFill>
+              </a14:hiddenFill>
+            </a:ext>
+            <a:ext uri="{91240B29-F687-4F45-9708-019B960494DF}">
+              <a14:hiddenLine xmlns:a14="http://schemas.microsoft.com/office/drawing/2010/main" w="9525">
+                <a:solidFill>
+                  <a:srgbClr val="000000"/>
+                </a:solidFill>
+                <a:miter lim="800000"/>
+                <a:headEnd/>
+                <a:tailEnd/>
+              </a14:hiddenLine>
+            </a:ext>
+          </a:extLst>
+        </p:spPr>
+        <p:txBody>
+          <a:bodyPr vert="horz" wrap="square" tIns="45720" bIns="45720" numCol="1" anchor="t" anchorCtr="0" compatLnSpc="1">
+            <a:prstTxWarp prst="textNoShape">
+              <a:avLst/>
+            </a:prstTxWarp>
+          </a:bodyPr>
+          <a:lstStyle/>
+          <a:p>
+            <a:pPr eaLnBrk="1" hangingPunct="1"/>
+            <a:r>
+              <a:rPr lang="de-CH" dirty="0">
+                <a:latin typeface="Lucida Sans" pitchFamily="34" charset="0"/>
+                <a:cs typeface="Lucida Sans Unicode" pitchFamily="34" charset="0"/>
+              </a:rPr>
+              <a:t>Danke für Ihre Aufmerksamkeit</a:t>
+            </a:r>
+          </a:p>
+        </p:txBody>
+      </p:sp>
+      <p:sp>
+        <p:nvSpPr>
+          <p:cNvPr id="8195" name="Untertitel 2"/>
+          <p:cNvSpPr>
+            <a:spLocks noGrp="1"/>
+          </p:cNvSpPr>
+          <p:nvPr>
+            <p:ph type="subTitle" idx="1"/>
+          </p:nvPr>
+        </p:nvSpPr>
+        <p:spPr bwMode="auto">
+          <a:xfrm>
+            <a:off x="457200" y="2447925"/>
+            <a:ext cx="7019925" cy="804863"/>
+          </a:xfrm>
+          <a:noFill/>
+          <a:extLst>
+            <a:ext uri="{909E8E84-426E-40DD-AFC4-6F175D3DCCD1}">
+              <a14:hiddenFill xmlns:a14="http://schemas.microsoft.com/office/drawing/2010/main">
+                <a:solidFill>
+                  <a:srgbClr val="FFFFFF"/>
+                </a:solidFill>
+              </a14:hiddenFill>
+            </a:ext>
+            <a:ext uri="{91240B29-F687-4F45-9708-019B960494DF}">
+              <a14:hiddenLine xmlns:a14="http://schemas.microsoft.com/office/drawing/2010/main" w="9525">
+                <a:solidFill>
+                  <a:srgbClr val="000000"/>
+                </a:solidFill>
+                <a:miter lim="800000"/>
+                <a:headEnd/>
+                <a:tailEnd/>
+              </a14:hiddenLine>
+            </a:ext>
+          </a:extLst>
+        </p:spPr>
+        <p:txBody>
+          <a:bodyPr vert="horz" wrap="square" tIns="45720" rIns="91440" bIns="45720" numCol="1" anchor="t" anchorCtr="0" compatLnSpc="1">
+            <a:prstTxWarp prst="textNoShape">
+              <a:avLst/>
+            </a:prstTxWarp>
+          </a:bodyPr>
+          <a:lstStyle/>
+          <a:p>
+            <a:pPr eaLnBrk="1" hangingPunct="1"/>
+            <a:endParaRPr lang="de-CH">
+              <a:latin typeface="Lucida Sans" pitchFamily="34" charset="0"/>
+              <a:cs typeface="Lucida Sans Unicode" pitchFamily="34" charset="0"/>
+            </a:endParaRPr>
+          </a:p>
+        </p:txBody>
+      </p:sp>
+    </p:spTree>
+  </p:cSld>
+  <p:clrMapOvr>
+    <a:masterClrMapping/>
+  </p:clrMapOvr>
+</p:sld>
+</file>
+
 <file path=ppt/slides/slide2.xml><?xml version="1.0" encoding="utf-8"?>
 <p:sld xmlns:a="http://schemas.openxmlformats.org/drawingml/2006/main" xmlns:r="http://schemas.openxmlformats.org/officeDocument/2006/relationships" xmlns:p="http://schemas.openxmlformats.org/presentationml/2006/main">
   <p:cSld>
@@ -7091,6 +7518,559 @@
 </file>
 
 <file path=ppt/slides/slide4.xml><?xml version="1.0" encoding="utf-8"?>
+<p:sld xmlns:a="http://schemas.openxmlformats.org/drawingml/2006/main" xmlns:r="http://schemas.openxmlformats.org/officeDocument/2006/relationships" xmlns:p="http://schemas.openxmlformats.org/presentationml/2006/main">
+  <p:cSld>
+    <p:spTree>
+      <p:nvGrpSpPr>
+        <p:cNvPr id="1" name=""/>
+        <p:cNvGrpSpPr/>
+        <p:nvPr/>
+      </p:nvGrpSpPr>
+      <p:grpSpPr>
+        <a:xfrm>
+          <a:off x="0" y="0"/>
+          <a:ext cx="0" cy="0"/>
+          <a:chOff x="0" y="0"/>
+          <a:chExt cx="0" cy="0"/>
+        </a:xfrm>
+      </p:grpSpPr>
+      <p:sp>
+        <p:nvSpPr>
+          <p:cNvPr id="4" name="Titel 3"/>
+          <p:cNvSpPr>
+            <a:spLocks noGrp="1"/>
+          </p:cNvSpPr>
+          <p:nvPr>
+            <p:ph type="ctrTitle"/>
+          </p:nvPr>
+        </p:nvSpPr>
+        <p:spPr/>
+        <p:txBody>
+          <a:bodyPr/>
+          <a:lstStyle/>
+          <a:p>
+            <a:r>
+              <a:rPr lang="de-CH" dirty="0" err="1"/>
+              <a:t>Scrum</a:t>
+            </a:r>
+            <a:r>
+              <a:rPr lang="de-CH" dirty="0"/>
+              <a:t> Review</a:t>
+            </a:r>
+          </a:p>
+        </p:txBody>
+      </p:sp>
+      <p:sp>
+        <p:nvSpPr>
+          <p:cNvPr id="5" name="Untertitel 4"/>
+          <p:cNvSpPr>
+            <a:spLocks noGrp="1"/>
+          </p:cNvSpPr>
+          <p:nvPr>
+            <p:ph type="subTitle" idx="1"/>
+          </p:nvPr>
+        </p:nvSpPr>
+        <p:spPr/>
+        <p:txBody>
+          <a:bodyPr/>
+          <a:lstStyle/>
+          <a:p>
+            <a:endParaRPr lang="de-CH"/>
+          </a:p>
+        </p:txBody>
+      </p:sp>
+    </p:spTree>
+    <p:extLst>
+      <p:ext uri="{BB962C8B-B14F-4D97-AF65-F5344CB8AC3E}">
+        <p14:creationId xmlns:p14="http://schemas.microsoft.com/office/powerpoint/2010/main" val="3272260713"/>
+      </p:ext>
+    </p:extLst>
+  </p:cSld>
+  <p:clrMapOvr>
+    <a:masterClrMapping/>
+  </p:clrMapOvr>
+</p:sld>
+</file>
+
+<file path=ppt/slides/slide5.xml><?xml version="1.0" encoding="utf-8"?>
+<p:sld xmlns:a="http://schemas.openxmlformats.org/drawingml/2006/main" xmlns:r="http://schemas.openxmlformats.org/officeDocument/2006/relationships" xmlns:p="http://schemas.openxmlformats.org/presentationml/2006/main">
+  <p:cSld>
+    <p:spTree>
+      <p:nvGrpSpPr>
+        <p:cNvPr id="1" name=""/>
+        <p:cNvGrpSpPr/>
+        <p:nvPr/>
+      </p:nvGrpSpPr>
+      <p:grpSpPr>
+        <a:xfrm>
+          <a:off x="0" y="0"/>
+          <a:ext cx="0" cy="0"/>
+          <a:chOff x="0" y="0"/>
+          <a:chExt cx="0" cy="0"/>
+        </a:xfrm>
+      </p:grpSpPr>
+      <p:sp>
+        <p:nvSpPr>
+          <p:cNvPr id="2" name="Inhaltsplatzhalter 1"/>
+          <p:cNvSpPr>
+            <a:spLocks noGrp="1"/>
+          </p:cNvSpPr>
+          <p:nvPr>
+            <p:ph sz="half" idx="1"/>
+          </p:nvPr>
+        </p:nvSpPr>
+        <p:spPr/>
+        <p:txBody>
+          <a:bodyPr/>
+          <a:lstStyle/>
+          <a:p>
+            <a:r>
+              <a:rPr lang="de-CH" dirty="0"/>
+              <a:t>Ziel:</a:t>
+            </a:r>
+          </a:p>
+          <a:p>
+            <a:pPr lvl="1"/>
+            <a:r>
+              <a:rPr lang="de-CH" dirty="0"/>
+              <a:t>Datenbankanbindung</a:t>
+            </a:r>
+          </a:p>
+          <a:p>
+            <a:pPr lvl="1"/>
+            <a:r>
+              <a:rPr lang="de-CH" dirty="0"/>
+              <a:t>Benutzeroberfläche mit </a:t>
+            </a:r>
+            <a:r>
+              <a:rPr lang="de-CH" dirty="0" err="1"/>
+              <a:t>Vaadin</a:t>
+            </a:r>
+            <a:endParaRPr lang="de-CH" dirty="0"/>
+          </a:p>
+          <a:p>
+            <a:pPr lvl="1"/>
+            <a:r>
+              <a:rPr lang="de-CH" dirty="0"/>
+              <a:t>Klassen erstellen</a:t>
+            </a:r>
+          </a:p>
+          <a:p>
+            <a:pPr lvl="1"/>
+            <a:endParaRPr lang="de-CH" dirty="0"/>
+          </a:p>
+          <a:p>
+            <a:r>
+              <a:rPr lang="de-CH" dirty="0"/>
+              <a:t>Durchführung:</a:t>
+            </a:r>
+          </a:p>
+          <a:p>
+            <a:pPr lvl="1"/>
+            <a:r>
+              <a:rPr lang="de-CH" dirty="0"/>
+              <a:t>Verlief nach Plan</a:t>
+            </a:r>
+          </a:p>
+          <a:p>
+            <a:pPr lvl="1"/>
+            <a:r>
+              <a:rPr lang="de-CH" dirty="0"/>
+              <a:t>Aufgaben unschön verteilt</a:t>
+            </a:r>
+          </a:p>
+          <a:p>
+            <a:pPr lvl="1"/>
+            <a:r>
+              <a:rPr lang="de-CH" dirty="0"/>
+              <a:t>Ziele zum Teil nicht erreicht</a:t>
+            </a:r>
+          </a:p>
+          <a:p>
+            <a:endParaRPr lang="de-CH" dirty="0"/>
+          </a:p>
+        </p:txBody>
+      </p:sp>
+      <p:sp>
+        <p:nvSpPr>
+          <p:cNvPr id="3" name="Titel 2"/>
+          <p:cNvSpPr>
+            <a:spLocks noGrp="1"/>
+          </p:cNvSpPr>
+          <p:nvPr>
+            <p:ph type="ctrTitle"/>
+          </p:nvPr>
+        </p:nvSpPr>
+        <p:spPr/>
+        <p:txBody>
+          <a:bodyPr/>
+          <a:lstStyle/>
+          <a:p>
+            <a:r>
+              <a:rPr lang="de-CH" dirty="0" err="1"/>
+              <a:t>Scrum</a:t>
+            </a:r>
+            <a:r>
+              <a:rPr lang="de-CH" dirty="0"/>
+              <a:t> Sprint 1</a:t>
+            </a:r>
+          </a:p>
+        </p:txBody>
+      </p:sp>
+    </p:spTree>
+    <p:extLst>
+      <p:ext uri="{BB962C8B-B14F-4D97-AF65-F5344CB8AC3E}">
+        <p14:creationId xmlns:p14="http://schemas.microsoft.com/office/powerpoint/2010/main" val="3773182407"/>
+      </p:ext>
+    </p:extLst>
+  </p:cSld>
+  <p:clrMapOvr>
+    <a:masterClrMapping/>
+  </p:clrMapOvr>
+</p:sld>
+</file>
+
+<file path=ppt/slides/slide6.xml><?xml version="1.0" encoding="utf-8"?>
+<p:sld xmlns:a="http://schemas.openxmlformats.org/drawingml/2006/main" xmlns:r="http://schemas.openxmlformats.org/officeDocument/2006/relationships" xmlns:p="http://schemas.openxmlformats.org/presentationml/2006/main">
+  <p:cSld>
+    <p:spTree>
+      <p:nvGrpSpPr>
+        <p:cNvPr id="1" name=""/>
+        <p:cNvGrpSpPr/>
+        <p:nvPr/>
+      </p:nvGrpSpPr>
+      <p:grpSpPr>
+        <a:xfrm>
+          <a:off x="0" y="0"/>
+          <a:ext cx="0" cy="0"/>
+          <a:chOff x="0" y="0"/>
+          <a:chExt cx="0" cy="0"/>
+        </a:xfrm>
+      </p:grpSpPr>
+      <p:sp>
+        <p:nvSpPr>
+          <p:cNvPr id="2" name="Inhaltsplatzhalter 1"/>
+          <p:cNvSpPr>
+            <a:spLocks noGrp="1"/>
+          </p:cNvSpPr>
+          <p:nvPr>
+            <p:ph sz="half" idx="1"/>
+          </p:nvPr>
+        </p:nvSpPr>
+        <p:spPr/>
+        <p:txBody>
+          <a:bodyPr/>
+          <a:lstStyle/>
+          <a:p>
+            <a:r>
+              <a:rPr lang="de-CH" dirty="0"/>
+              <a:t>Ziel: </a:t>
+            </a:r>
+          </a:p>
+          <a:p>
+            <a:pPr lvl="1"/>
+            <a:r>
+              <a:rPr lang="de-CH" dirty="0"/>
+              <a:t>Verbesserungsarbeiten an Sprint 1</a:t>
+            </a:r>
+          </a:p>
+          <a:p>
+            <a:pPr lvl="1"/>
+            <a:r>
+              <a:rPr lang="de-CH" dirty="0"/>
+              <a:t>Daten aus Datenbank in Java herauslesen</a:t>
+            </a:r>
+          </a:p>
+          <a:p>
+            <a:pPr lvl="1"/>
+            <a:r>
+              <a:rPr lang="de-CH" dirty="0"/>
+              <a:t>Klassenassoziationen</a:t>
+            </a:r>
+          </a:p>
+          <a:p>
+            <a:pPr lvl="1"/>
+            <a:endParaRPr lang="de-CH" dirty="0"/>
+          </a:p>
+          <a:p>
+            <a:r>
+              <a:rPr lang="de-CH" dirty="0"/>
+              <a:t>Durchführung:</a:t>
+            </a:r>
+          </a:p>
+          <a:p>
+            <a:pPr lvl="1"/>
+            <a:r>
+              <a:rPr lang="de-CH" dirty="0"/>
+              <a:t>Mehr Zeit beansprucht als eingeplant</a:t>
+            </a:r>
+          </a:p>
+          <a:p>
+            <a:pPr lvl="1"/>
+            <a:r>
+              <a:rPr lang="de-CH" dirty="0"/>
+              <a:t>Problem mit Datenherauslesen</a:t>
+            </a:r>
+          </a:p>
+          <a:p>
+            <a:endParaRPr lang="de-CH" dirty="0"/>
+          </a:p>
+        </p:txBody>
+      </p:sp>
+      <p:sp>
+        <p:nvSpPr>
+          <p:cNvPr id="3" name="Titel 2"/>
+          <p:cNvSpPr>
+            <a:spLocks noGrp="1"/>
+          </p:cNvSpPr>
+          <p:nvPr>
+            <p:ph type="ctrTitle"/>
+          </p:nvPr>
+        </p:nvSpPr>
+        <p:spPr/>
+        <p:txBody>
+          <a:bodyPr/>
+          <a:lstStyle/>
+          <a:p>
+            <a:r>
+              <a:rPr lang="de-CH" dirty="0" err="1"/>
+              <a:t>Scrum</a:t>
+            </a:r>
+            <a:r>
+              <a:rPr lang="de-CH" dirty="0"/>
+              <a:t> Sprint 2</a:t>
+            </a:r>
+          </a:p>
+        </p:txBody>
+      </p:sp>
+    </p:spTree>
+    <p:extLst>
+      <p:ext uri="{BB962C8B-B14F-4D97-AF65-F5344CB8AC3E}">
+        <p14:creationId xmlns:p14="http://schemas.microsoft.com/office/powerpoint/2010/main" val="253942649"/>
+      </p:ext>
+    </p:extLst>
+  </p:cSld>
+  <p:clrMapOvr>
+    <a:masterClrMapping/>
+  </p:clrMapOvr>
+</p:sld>
+</file>
+
+<file path=ppt/slides/slide7.xml><?xml version="1.0" encoding="utf-8"?>
+<p:sld xmlns:a="http://schemas.openxmlformats.org/drawingml/2006/main" xmlns:r="http://schemas.openxmlformats.org/officeDocument/2006/relationships" xmlns:p="http://schemas.openxmlformats.org/presentationml/2006/main">
+  <p:cSld>
+    <p:spTree>
+      <p:nvGrpSpPr>
+        <p:cNvPr id="1" name=""/>
+        <p:cNvGrpSpPr/>
+        <p:nvPr/>
+      </p:nvGrpSpPr>
+      <p:grpSpPr>
+        <a:xfrm>
+          <a:off x="0" y="0"/>
+          <a:ext cx="0" cy="0"/>
+          <a:chOff x="0" y="0"/>
+          <a:chExt cx="0" cy="0"/>
+        </a:xfrm>
+      </p:grpSpPr>
+      <p:sp>
+        <p:nvSpPr>
+          <p:cNvPr id="2" name="Inhaltsplatzhalter 1"/>
+          <p:cNvSpPr>
+            <a:spLocks noGrp="1"/>
+          </p:cNvSpPr>
+          <p:nvPr>
+            <p:ph sz="half" idx="1"/>
+          </p:nvPr>
+        </p:nvSpPr>
+        <p:spPr/>
+        <p:txBody>
+          <a:bodyPr/>
+          <a:lstStyle/>
+          <a:p>
+            <a:r>
+              <a:rPr lang="de-CH" dirty="0"/>
+              <a:t>Ziel:</a:t>
+            </a:r>
+          </a:p>
+          <a:p>
+            <a:pPr lvl="1"/>
+            <a:r>
+              <a:rPr lang="de-CH" dirty="0"/>
+              <a:t>Daten für Benutzeroberfläche nutzbar machen</a:t>
+            </a:r>
+          </a:p>
+          <a:p>
+            <a:pPr lvl="1"/>
+            <a:r>
+              <a:rPr lang="de-CH" dirty="0"/>
+              <a:t>Werte in Datenbank aufbereiten</a:t>
+            </a:r>
+          </a:p>
+          <a:p>
+            <a:pPr lvl="1"/>
+            <a:endParaRPr lang="de-CH" dirty="0"/>
+          </a:p>
+          <a:p>
+            <a:r>
+              <a:rPr lang="de-CH" dirty="0"/>
+              <a:t>Durchführung:</a:t>
+            </a:r>
+          </a:p>
+          <a:p>
+            <a:pPr lvl="1"/>
+            <a:r>
+              <a:rPr lang="de-CH" dirty="0"/>
+              <a:t>Struktur der Klassen und Datenbank umstellen (Datenbank generieren lassen)</a:t>
+            </a:r>
+          </a:p>
+          <a:p>
+            <a:pPr lvl="1"/>
+            <a:r>
+              <a:rPr lang="de-CH" dirty="0"/>
+              <a:t>Daten herauslesen</a:t>
+            </a:r>
+          </a:p>
+          <a:p>
+            <a:endParaRPr lang="de-CH" dirty="0"/>
+          </a:p>
+        </p:txBody>
+      </p:sp>
+      <p:sp>
+        <p:nvSpPr>
+          <p:cNvPr id="3" name="Titel 2"/>
+          <p:cNvSpPr>
+            <a:spLocks noGrp="1"/>
+          </p:cNvSpPr>
+          <p:nvPr>
+            <p:ph type="ctrTitle"/>
+          </p:nvPr>
+        </p:nvSpPr>
+        <p:spPr/>
+        <p:txBody>
+          <a:bodyPr/>
+          <a:lstStyle/>
+          <a:p>
+            <a:r>
+              <a:rPr lang="de-CH" dirty="0" err="1"/>
+              <a:t>Scrum</a:t>
+            </a:r>
+            <a:r>
+              <a:rPr lang="de-CH" dirty="0"/>
+              <a:t> Sprint 3</a:t>
+            </a:r>
+          </a:p>
+        </p:txBody>
+      </p:sp>
+    </p:spTree>
+    <p:extLst>
+      <p:ext uri="{BB962C8B-B14F-4D97-AF65-F5344CB8AC3E}">
+        <p14:creationId xmlns:p14="http://schemas.microsoft.com/office/powerpoint/2010/main" val="2076749258"/>
+      </p:ext>
+    </p:extLst>
+  </p:cSld>
+  <p:clrMapOvr>
+    <a:masterClrMapping/>
+  </p:clrMapOvr>
+</p:sld>
+</file>
+
+<file path=ppt/slides/slide8.xml><?xml version="1.0" encoding="utf-8"?>
+<p:sld xmlns:a="http://schemas.openxmlformats.org/drawingml/2006/main" xmlns:r="http://schemas.openxmlformats.org/officeDocument/2006/relationships" xmlns:p="http://schemas.openxmlformats.org/presentationml/2006/main">
+  <p:cSld>
+    <p:spTree>
+      <p:nvGrpSpPr>
+        <p:cNvPr id="1" name=""/>
+        <p:cNvGrpSpPr/>
+        <p:nvPr/>
+      </p:nvGrpSpPr>
+      <p:grpSpPr>
+        <a:xfrm>
+          <a:off x="0" y="0"/>
+          <a:ext cx="0" cy="0"/>
+          <a:chOff x="0" y="0"/>
+          <a:chExt cx="0" cy="0"/>
+        </a:xfrm>
+      </p:grpSpPr>
+      <p:sp>
+        <p:nvSpPr>
+          <p:cNvPr id="2" name="Inhaltsplatzhalter 1"/>
+          <p:cNvSpPr>
+            <a:spLocks noGrp="1"/>
+          </p:cNvSpPr>
+          <p:nvPr>
+            <p:ph sz="half" idx="1"/>
+          </p:nvPr>
+        </p:nvSpPr>
+        <p:spPr/>
+        <p:txBody>
+          <a:bodyPr/>
+          <a:lstStyle/>
+          <a:p>
+            <a:r>
+              <a:rPr lang="de-CH" dirty="0"/>
+              <a:t>Weniger erreicht als vorgenommen</a:t>
+            </a:r>
+          </a:p>
+          <a:p>
+            <a:r>
+              <a:rPr lang="de-CH" dirty="0"/>
+              <a:t>Alle in der Gruppen haben ihren Beitrag geleistet</a:t>
+            </a:r>
+          </a:p>
+          <a:p>
+            <a:r>
+              <a:rPr lang="de-CH" dirty="0"/>
+              <a:t>Neue Vorgehensweise braucht zuerst </a:t>
+            </a:r>
+            <a:r>
+              <a:rPr lang="de-CH" dirty="0" err="1"/>
+              <a:t>Einlebungszeit</a:t>
+            </a:r>
+            <a:endParaRPr lang="de-CH" dirty="0"/>
+          </a:p>
+          <a:p>
+            <a:endParaRPr lang="de-CH" dirty="0"/>
+          </a:p>
+        </p:txBody>
+      </p:sp>
+      <p:sp>
+        <p:nvSpPr>
+          <p:cNvPr id="3" name="Titel 2"/>
+          <p:cNvSpPr>
+            <a:spLocks noGrp="1"/>
+          </p:cNvSpPr>
+          <p:nvPr>
+            <p:ph type="ctrTitle"/>
+          </p:nvPr>
+        </p:nvSpPr>
+        <p:spPr/>
+        <p:txBody>
+          <a:bodyPr/>
+          <a:lstStyle/>
+          <a:p>
+            <a:r>
+              <a:rPr lang="de-CH"/>
+              <a:t>Rückblick</a:t>
+            </a:r>
+            <a:endParaRPr lang="de-CH"/>
+          </a:p>
+        </p:txBody>
+      </p:sp>
+    </p:spTree>
+    <p:extLst>
+      <p:ext uri="{BB962C8B-B14F-4D97-AF65-F5344CB8AC3E}">
+        <p14:creationId xmlns:p14="http://schemas.microsoft.com/office/powerpoint/2010/main" val="2549577588"/>
+      </p:ext>
+    </p:extLst>
+  </p:cSld>
+  <p:clrMapOvr>
+    <a:masterClrMapping/>
+  </p:clrMapOvr>
+</p:sld>
+</file>
+
+<file path=ppt/slides/slide9.xml><?xml version="1.0" encoding="utf-8"?>
 <p:sld xmlns:a="http://schemas.openxmlformats.org/drawingml/2006/main" xmlns:r="http://schemas.openxmlformats.org/officeDocument/2006/relationships" xmlns:p="http://schemas.openxmlformats.org/presentationml/2006/main">
   <p:cSld>
     <p:spTree>
@@ -7133,8 +8113,20 @@
                 <a:tableStyleId>{F5AB1C69-6EDB-4FF4-983F-18BD219EF322}</a:tableStyleId>
               </a:tblPr>
               <a:tblGrid>
-                <a:gridCol w="5624513"/>
-                <a:gridCol w="5624513"/>
+                <a:gridCol w="5624513">
+                  <a:extLst>
+                    <a:ext uri="{9D8B030D-6E8A-4147-A177-3AD203B41FA5}">
+                      <a16:colId xmlns:a16="http://schemas.microsoft.com/office/drawing/2014/main" val="20000"/>
+                    </a:ext>
+                  </a:extLst>
+                </a:gridCol>
+                <a:gridCol w="5624513">
+                  <a:extLst>
+                    <a:ext uri="{9D8B030D-6E8A-4147-A177-3AD203B41FA5}">
+                      <a16:colId xmlns:a16="http://schemas.microsoft.com/office/drawing/2014/main" val="20001"/>
+                    </a:ext>
+                  </a:extLst>
+                </a:gridCol>
               </a:tblGrid>
               <a:tr h="370840">
                 <a:tc>
@@ -7143,10 +8135,9 @@
                     <a:lstStyle/>
                     <a:p>
                       <a:r>
-                        <a:rPr lang="de-CH" dirty="0" smtClean="0"/>
+                        <a:rPr lang="de-CH" dirty="0"/>
                         <a:t>Person </a:t>
                       </a:r>
-                      <a:endParaRPr lang="de-CH" dirty="0"/>
                     </a:p>
                   </a:txBody>
                   <a:tcPr/>
@@ -7157,14 +8148,18 @@
                     <a:lstStyle/>
                     <a:p>
                       <a:r>
-                        <a:rPr lang="de-CH" dirty="0" smtClean="0"/>
+                        <a:rPr lang="de-CH" dirty="0"/>
                         <a:t>Arbeit</a:t>
                       </a:r>
-                      <a:endParaRPr lang="de-CH" dirty="0"/>
                     </a:p>
                   </a:txBody>
                   <a:tcPr/>
                 </a:tc>
+                <a:extLst>
+                  <a:ext uri="{0D108BD9-81ED-4DB2-BD59-A6C34878D82A}">
+                    <a16:rowId xmlns:a16="http://schemas.microsoft.com/office/drawing/2014/main" val="10000"/>
+                  </a:ext>
+                </a:extLst>
               </a:tr>
               <a:tr h="348684">
                 <a:tc>
@@ -7173,11 +8168,11 @@
                     <a:lstStyle/>
                     <a:p>
                       <a:r>
-                        <a:rPr lang="de-CH" dirty="0" smtClean="0"/>
+                        <a:rPr lang="de-CH" dirty="0"/>
                         <a:t>Claudia</a:t>
                       </a:r>
                       <a:r>
-                        <a:rPr lang="de-CH" baseline="0" dirty="0" smtClean="0"/>
+                        <a:rPr lang="de-CH" baseline="0" dirty="0"/>
                         <a:t> Telesca </a:t>
                       </a:r>
                       <a:endParaRPr lang="de-CH" dirty="0"/>
@@ -7191,23 +8186,23 @@
                     <a:lstStyle/>
                     <a:p>
                       <a:r>
-                        <a:rPr lang="de-CH" dirty="0" err="1" smtClean="0"/>
+                        <a:rPr lang="de-CH" dirty="0" err="1"/>
                         <a:t>Vaadin</a:t>
                       </a:r>
                       <a:r>
-                        <a:rPr lang="de-CH" dirty="0" smtClean="0"/>
+                        <a:rPr lang="de-CH" dirty="0"/>
                         <a:t> GUI,</a:t>
                       </a:r>
                       <a:r>
-                        <a:rPr lang="de-CH" baseline="0" dirty="0" smtClean="0"/>
+                        <a:rPr lang="de-CH" baseline="0" dirty="0"/>
                         <a:t>  </a:t>
                       </a:r>
                       <a:r>
-                        <a:rPr lang="de-CH" baseline="0" dirty="0" err="1" smtClean="0"/>
+                        <a:rPr lang="de-CH" baseline="0" dirty="0" err="1"/>
                         <a:t>Persistence</a:t>
                       </a:r>
                       <a:r>
-                        <a:rPr lang="de-CH" baseline="0" dirty="0" smtClean="0"/>
+                        <a:rPr lang="de-CH" baseline="0" dirty="0"/>
                         <a:t>, Daten aus Datenbank in GUI anzeigen, MVC </a:t>
                       </a:r>
                       <a:endParaRPr lang="de-CH" dirty="0"/>
@@ -7215,6 +8210,11 @@
                   </a:txBody>
                   <a:tcPr/>
                 </a:tc>
+                <a:extLst>
+                  <a:ext uri="{0D108BD9-81ED-4DB2-BD59-A6C34878D82A}">
+                    <a16:rowId xmlns:a16="http://schemas.microsoft.com/office/drawing/2014/main" val="10001"/>
+                  </a:ext>
+                </a:extLst>
               </a:tr>
               <a:tr h="370840">
                 <a:tc>
@@ -7223,10 +8223,9 @@
                     <a:lstStyle/>
                     <a:p>
                       <a:r>
-                        <a:rPr lang="de-CH" dirty="0" smtClean="0"/>
+                        <a:rPr lang="de-CH" dirty="0"/>
                         <a:t>Patrick Jolo </a:t>
                       </a:r>
-                      <a:endParaRPr lang="de-CH" dirty="0"/>
                     </a:p>
                   </a:txBody>
                   <a:tcPr/>
@@ -7254,22 +8253,23 @@
                         <a:defRPr/>
                       </a:pPr>
                       <a:r>
-                        <a:rPr lang="de-CH" dirty="0" err="1" smtClean="0"/>
+                        <a:rPr lang="de-CH" dirty="0" err="1"/>
                         <a:t>Vaadin</a:t>
                       </a:r>
                       <a:r>
-                        <a:rPr lang="de-CH" baseline="0" dirty="0" smtClean="0"/>
-                        <a:t> GUI (Verbindungen der einzelnen Views), </a:t>
+                        <a:rPr lang="de-CH" baseline="0" dirty="0"/>
+                        <a:t> GUI (Verbindungen der einzelnen Views), Daten aus Datenbank in GUI anzeigen, MVC</a:t>
                       </a:r>
-                      <a:r>
-                        <a:rPr lang="de-CH" baseline="0" dirty="0" smtClean="0"/>
-                        <a:t>Daten aus Datenbank in GUI anzeigen, MVC</a:t>
-                      </a:r>
-                      <a:endParaRPr lang="de-CH" dirty="0" smtClean="0"/>
+                      <a:endParaRPr lang="de-CH" dirty="0"/>
                     </a:p>
                   </a:txBody>
                   <a:tcPr/>
                 </a:tc>
+                <a:extLst>
+                  <a:ext uri="{0D108BD9-81ED-4DB2-BD59-A6C34878D82A}">
+                    <a16:rowId xmlns:a16="http://schemas.microsoft.com/office/drawing/2014/main" val="10002"/>
+                  </a:ext>
+                </a:extLst>
               </a:tr>
               <a:tr h="370840">
                 <a:tc>
@@ -7278,19 +8278,19 @@
                     <a:lstStyle/>
                     <a:p>
                       <a:r>
-                        <a:rPr lang="de-CH" dirty="0" err="1" smtClean="0"/>
+                        <a:rPr lang="de-CH" dirty="0" err="1"/>
                         <a:t>Niveadha</a:t>
                       </a:r>
                       <a:r>
-                        <a:rPr lang="de-CH" baseline="0" dirty="0" smtClean="0"/>
+                        <a:rPr lang="de-CH" baseline="0" dirty="0"/>
                         <a:t> </a:t>
                       </a:r>
                       <a:r>
-                        <a:rPr lang="de-CH" baseline="0" dirty="0" err="1" smtClean="0"/>
+                        <a:rPr lang="de-CH" baseline="0" dirty="0" err="1"/>
                         <a:t>Kanagarasa</a:t>
                       </a:r>
                       <a:r>
-                        <a:rPr lang="de-CH" baseline="0" dirty="0" smtClean="0"/>
+                        <a:rPr lang="de-CH" baseline="0" dirty="0"/>
                         <a:t> </a:t>
                       </a:r>
                       <a:endParaRPr lang="de-CH" dirty="0"/>
@@ -7321,22 +8321,23 @@
                         <a:defRPr/>
                       </a:pPr>
                       <a:r>
-                        <a:rPr lang="de-CH" dirty="0" smtClean="0"/>
-                        <a:t>JPA Connection, </a:t>
+                        <a:rPr lang="de-CH" dirty="0"/>
+                        <a:t>JPA Connection, Verbindung von Datenbank zu </a:t>
                       </a:r>
                       <a:r>
-                        <a:rPr lang="de-CH" dirty="0" smtClean="0"/>
-                        <a:t>Verbindung von Datenbank zu </a:t>
-                      </a:r>
-                      <a:r>
-                        <a:rPr lang="de-CH" dirty="0" err="1" smtClean="0"/>
+                        <a:rPr lang="de-CH" dirty="0" err="1"/>
                         <a:t>Eclipse</a:t>
                       </a:r>
-                      <a:endParaRPr lang="de-CH" dirty="0" smtClean="0"/>
+                      <a:endParaRPr lang="de-CH" dirty="0"/>
                     </a:p>
                   </a:txBody>
                   <a:tcPr/>
                 </a:tc>
+                <a:extLst>
+                  <a:ext uri="{0D108BD9-81ED-4DB2-BD59-A6C34878D82A}">
+                    <a16:rowId xmlns:a16="http://schemas.microsoft.com/office/drawing/2014/main" val="10003"/>
+                  </a:ext>
+                </a:extLst>
               </a:tr>
               <a:tr h="370840">
                 <a:tc>
@@ -7345,11 +8346,11 @@
                     <a:lstStyle/>
                     <a:p>
                       <a:r>
-                        <a:rPr lang="de-CH" dirty="0" smtClean="0"/>
+                        <a:rPr lang="de-CH" dirty="0"/>
                         <a:t>Remy</a:t>
                       </a:r>
                       <a:r>
-                        <a:rPr lang="de-CH" baseline="0" dirty="0" smtClean="0"/>
+                        <a:rPr lang="de-CH" baseline="0" dirty="0"/>
                         <a:t> Lam</a:t>
                       </a:r>
                       <a:endParaRPr lang="de-CH" dirty="0"/>
@@ -7380,26 +8381,31 @@
                         <a:defRPr/>
                       </a:pPr>
                       <a:r>
-                        <a:rPr lang="de-CH" dirty="0" smtClean="0"/>
+                        <a:rPr lang="de-CH" dirty="0"/>
                         <a:t>Datenbank</a:t>
                       </a:r>
                       <a:r>
-                        <a:rPr lang="de-CH" baseline="0" dirty="0" smtClean="0"/>
+                        <a:rPr lang="de-CH" baseline="0" dirty="0"/>
                         <a:t> aufsetzen, Daten in Datenbank eingefügt, </a:t>
                       </a:r>
                       <a:r>
-                        <a:rPr lang="de-CH" dirty="0" smtClean="0"/>
+                        <a:rPr lang="de-CH" dirty="0"/>
                         <a:t>Verbindung von Datenbank zu </a:t>
                       </a:r>
                       <a:r>
-                        <a:rPr lang="de-CH" dirty="0" err="1" smtClean="0"/>
+                        <a:rPr lang="de-CH" dirty="0" err="1"/>
                         <a:t>Eclipse</a:t>
                       </a:r>
-                      <a:endParaRPr lang="de-CH" dirty="0" smtClean="0"/>
+                      <a:endParaRPr lang="de-CH" dirty="0"/>
                     </a:p>
                   </a:txBody>
                   <a:tcPr/>
                 </a:tc>
+                <a:extLst>
+                  <a:ext uri="{0D108BD9-81ED-4DB2-BD59-A6C34878D82A}">
+                    <a16:rowId xmlns:a16="http://schemas.microsoft.com/office/drawing/2014/main" val="10004"/>
+                  </a:ext>
+                </a:extLst>
               </a:tr>
               <a:tr h="370840">
                 <a:tc>
@@ -7408,22 +8414,21 @@
                     <a:lstStyle/>
                     <a:p>
                       <a:r>
-                        <a:rPr lang="de-CH" dirty="0" smtClean="0"/>
+                        <a:rPr lang="de-CH" dirty="0"/>
                         <a:t>Pascal</a:t>
                       </a:r>
                       <a:r>
-                        <a:rPr lang="de-CH" baseline="0" dirty="0" smtClean="0"/>
+                        <a:rPr lang="de-CH" baseline="0" dirty="0"/>
                         <a:t> </a:t>
                       </a:r>
                       <a:r>
-                        <a:rPr lang="de-CH" baseline="0" dirty="0" err="1" smtClean="0"/>
+                        <a:rPr lang="de-CH" baseline="0" dirty="0" err="1"/>
                         <a:t>Dittli</a:t>
                       </a:r>
                       <a:r>
-                        <a:rPr lang="de-CH" baseline="0" dirty="0" smtClean="0"/>
+                        <a:rPr lang="de-CH" baseline="0" dirty="0"/>
                         <a:t> </a:t>
                       </a:r>
-                      <a:endParaRPr lang="de-CH" baseline="0" dirty="0" smtClean="0"/>
                     </a:p>
                   </a:txBody>
                   <a:tcPr/>
@@ -7451,13 +8456,18 @@
                         <a:defRPr/>
                       </a:pPr>
                       <a:r>
-                        <a:rPr lang="de-CH" dirty="0" smtClean="0"/>
+                        <a:rPr lang="de-CH" dirty="0"/>
                         <a:t>Datenbank aufsetzen</a:t>
                       </a:r>
                     </a:p>
                   </a:txBody>
                   <a:tcPr/>
                 </a:tc>
+                <a:extLst>
+                  <a:ext uri="{0D108BD9-81ED-4DB2-BD59-A6C34878D82A}">
+                    <a16:rowId xmlns:a16="http://schemas.microsoft.com/office/drawing/2014/main" val="10005"/>
+                  </a:ext>
+                </a:extLst>
               </a:tr>
               <a:tr h="370840">
                 <a:tc>
@@ -7466,7 +8476,7 @@
                     <a:lstStyle/>
                     <a:p>
                       <a:r>
-                        <a:rPr lang="de-CH" baseline="0" dirty="0" smtClean="0"/>
+                        <a:rPr lang="de-CH" baseline="0" dirty="0"/>
                         <a:t>Fabian Kammermann</a:t>
                       </a:r>
                     </a:p>
@@ -7496,25 +8506,30 @@
                         <a:defRPr/>
                       </a:pPr>
                       <a:r>
-                        <a:rPr lang="de-CH" dirty="0" err="1" smtClean="0"/>
+                        <a:rPr lang="de-CH" dirty="0" err="1"/>
                         <a:t>Associations</a:t>
                       </a:r>
                       <a:r>
-                        <a:rPr lang="de-CH" dirty="0" smtClean="0"/>
+                        <a:rPr lang="de-CH" dirty="0"/>
                         <a:t> der einzelnen Klassen</a:t>
                       </a:r>
                       <a:r>
-                        <a:rPr lang="de-CH" baseline="0" dirty="0" smtClean="0"/>
+                        <a:rPr lang="de-CH" baseline="0" dirty="0"/>
                         <a:t> +</a:t>
                       </a:r>
                       <a:r>
-                        <a:rPr lang="de-CH" dirty="0" smtClean="0"/>
+                        <a:rPr lang="de-CH" dirty="0"/>
                         <a:t> Verbesserungen/Korrekturen des Codes vorgenommen</a:t>
                       </a:r>
                     </a:p>
                   </a:txBody>
                   <a:tcPr/>
                 </a:tc>
+                <a:extLst>
+                  <a:ext uri="{0D108BD9-81ED-4DB2-BD59-A6C34878D82A}">
+                    <a16:rowId xmlns:a16="http://schemas.microsoft.com/office/drawing/2014/main" val="10006"/>
+                  </a:ext>
+                </a:extLst>
               </a:tr>
               <a:tr h="370840">
                 <a:tc>
@@ -7540,14 +8555,14 @@
                         <a:defRPr/>
                       </a:pPr>
                       <a:r>
-                        <a:rPr lang="de-CH" dirty="0" err="1" smtClean="0"/>
+                        <a:rPr lang="de-CH" dirty="0" err="1"/>
                         <a:t>Burcu</a:t>
                       </a:r>
                       <a:r>
-                        <a:rPr lang="de-CH" baseline="0" dirty="0" smtClean="0"/>
+                        <a:rPr lang="de-CH" baseline="0" dirty="0"/>
                         <a:t> Sevinc</a:t>
                       </a:r>
-                      <a:endParaRPr lang="de-CH" dirty="0" smtClean="0"/>
+                      <a:endParaRPr lang="de-CH" dirty="0"/>
                     </a:p>
                   </a:txBody>
                   <a:tcPr/>
@@ -7575,37 +8590,42 @@
                         <a:defRPr/>
                       </a:pPr>
                       <a:r>
-                        <a:rPr lang="de-CH" dirty="0" smtClean="0"/>
+                        <a:rPr lang="de-CH" dirty="0"/>
                         <a:t>Grundbaustein der Klasse erstellt,</a:t>
                       </a:r>
                       <a:r>
-                        <a:rPr lang="de-CH" baseline="0" dirty="0" smtClean="0"/>
+                        <a:rPr lang="de-CH" baseline="0" dirty="0"/>
                         <a:t> </a:t>
                       </a:r>
                       <a:r>
-                        <a:rPr lang="de-CH" dirty="0" smtClean="0"/>
+                        <a:rPr lang="de-CH" dirty="0"/>
                         <a:t>Daten in Datenbank eingefügt,</a:t>
                       </a:r>
                       <a:r>
-                        <a:rPr lang="de-CH" baseline="0" dirty="0" smtClean="0"/>
+                        <a:rPr lang="de-CH" baseline="0" dirty="0"/>
                         <a:t> </a:t>
                       </a:r>
                       <a:r>
-                        <a:rPr lang="de-CH" dirty="0" smtClean="0"/>
+                        <a:rPr lang="de-CH" dirty="0"/>
                         <a:t>Code </a:t>
                       </a:r>
                       <a:r>
-                        <a:rPr lang="de-CH" dirty="0" err="1" smtClean="0"/>
+                        <a:rPr lang="de-CH" dirty="0" err="1"/>
                         <a:t>review</a:t>
                       </a:r>
                       <a:r>
-                        <a:rPr lang="de-CH" dirty="0" smtClean="0"/>
+                        <a:rPr lang="de-CH" dirty="0"/>
                         <a:t> -&gt; Vorschläge/Korrekturen und Verbesserungen vorgenommen</a:t>
                       </a:r>
                     </a:p>
                   </a:txBody>
                   <a:tcPr/>
                 </a:tc>
+                <a:extLst>
+                  <a:ext uri="{0D108BD9-81ED-4DB2-BD59-A6C34878D82A}">
+                    <a16:rowId xmlns:a16="http://schemas.microsoft.com/office/drawing/2014/main" val="10007"/>
+                  </a:ext>
+                </a:extLst>
               </a:tr>
             </a:tbl>
           </a:graphicData>
@@ -7662,439 +8682,6 @@
               </a:rPr>
               <a:t>Wer hat was gemacht</a:t>
             </a:r>
-          </a:p>
-        </p:txBody>
-      </p:sp>
-    </p:spTree>
-  </p:cSld>
-  <p:clrMapOvr>
-    <a:masterClrMapping/>
-  </p:clrMapOvr>
-</p:sld>
-</file>
-
-<file path=ppt/slides/slide5.xml><?xml version="1.0" encoding="utf-8"?>
-<p:sld xmlns:a="http://schemas.openxmlformats.org/drawingml/2006/main" xmlns:r="http://schemas.openxmlformats.org/officeDocument/2006/relationships" xmlns:p="http://schemas.openxmlformats.org/presentationml/2006/main">
-  <p:cSld>
-    <p:spTree>
-      <p:nvGrpSpPr>
-        <p:cNvPr id="1" name=""/>
-        <p:cNvGrpSpPr/>
-        <p:nvPr/>
-      </p:nvGrpSpPr>
-      <p:grpSpPr>
-        <a:xfrm>
-          <a:off x="0" y="0"/>
-          <a:ext cx="0" cy="0"/>
-          <a:chOff x="0" y="0"/>
-          <a:chExt cx="0" cy="0"/>
-        </a:xfrm>
-      </p:grpSpPr>
-      <p:sp>
-        <p:nvSpPr>
-          <p:cNvPr id="10242" name="Inhaltsplatzhalter 1"/>
-          <p:cNvSpPr>
-            <a:spLocks noGrp="1"/>
-          </p:cNvSpPr>
-          <p:nvPr>
-            <p:ph sz="half" idx="1"/>
-          </p:nvPr>
-        </p:nvSpPr>
-        <p:spPr bwMode="auto">
-          <a:xfrm>
-            <a:off x="457200" y="1331913"/>
-            <a:ext cx="11249025" cy="4787900"/>
-          </a:xfrm>
-          <a:noFill/>
-          <a:extLst>
-            <a:ext uri="{909E8E84-426E-40DD-AFC4-6F175D3DCCD1}">
-              <a14:hiddenFill xmlns:a14="http://schemas.microsoft.com/office/drawing/2010/main">
-                <a:solidFill>
-                  <a:srgbClr val="FFFFFF"/>
-                </a:solidFill>
-              </a14:hiddenFill>
-            </a:ext>
-            <a:ext uri="{91240B29-F687-4F45-9708-019B960494DF}">
-              <a14:hiddenLine xmlns:a14="http://schemas.microsoft.com/office/drawing/2010/main" w="9525">
-                <a:solidFill>
-                  <a:srgbClr val="000000"/>
-                </a:solidFill>
-                <a:miter lim="800000"/>
-                <a:headEnd/>
-                <a:tailEnd/>
-              </a14:hiddenLine>
-            </a:ext>
-          </a:extLst>
-        </p:spPr>
-        <p:txBody>
-          <a:bodyPr vert="horz" wrap="square" tIns="45720" bIns="45720" numCol="1" anchor="t" anchorCtr="0" compatLnSpc="1">
-            <a:prstTxWarp prst="textNoShape">
-              <a:avLst/>
-            </a:prstTxWarp>
-          </a:bodyPr>
-          <a:lstStyle/>
-          <a:p>
-            <a:pPr eaLnBrk="1" hangingPunct="1">
-              <a:buFont typeface="Lucida Grande" charset="0"/>
-              <a:buChar char="▶"/>
-            </a:pPr>
-            <a:r>
-              <a:rPr lang="de-CH" dirty="0" smtClean="0">
-                <a:latin typeface="Lucida Sans" pitchFamily="34" charset="0"/>
-              </a:rPr>
-              <a:t>Kommunikation wichtig </a:t>
-            </a:r>
-          </a:p>
-          <a:p>
-            <a:pPr eaLnBrk="1" hangingPunct="1">
-              <a:buFont typeface="Lucida Grande" charset="0"/>
-              <a:buChar char="▶"/>
-            </a:pPr>
-            <a:r>
-              <a:rPr lang="de-CH" dirty="0" err="1" smtClean="0">
-                <a:latin typeface="Lucida Sans" pitchFamily="34" charset="0"/>
-              </a:rPr>
-              <a:t>Designthinking</a:t>
-            </a:r>
-            <a:r>
-              <a:rPr lang="de-CH" dirty="0" smtClean="0">
-                <a:latin typeface="Lucida Sans" pitchFamily="34" charset="0"/>
-              </a:rPr>
-              <a:t>-Phase </a:t>
-            </a:r>
-          </a:p>
-          <a:p>
-            <a:pPr>
-              <a:buFont typeface="Lucida Grande" charset="0"/>
-              <a:buChar char="▶"/>
-            </a:pPr>
-            <a:r>
-              <a:rPr lang="de-CH" dirty="0">
-                <a:latin typeface="Lucida Sans" pitchFamily="34" charset="0"/>
-              </a:rPr>
-              <a:t>Learning </a:t>
-            </a:r>
-            <a:r>
-              <a:rPr lang="de-CH" dirty="0" err="1">
-                <a:latin typeface="Lucida Sans" pitchFamily="34" charset="0"/>
-              </a:rPr>
-              <a:t>by</a:t>
-            </a:r>
-            <a:r>
-              <a:rPr lang="de-CH" dirty="0">
-                <a:latin typeface="Lucida Sans" pitchFamily="34" charset="0"/>
-              </a:rPr>
-              <a:t> </a:t>
-            </a:r>
-            <a:r>
-              <a:rPr lang="de-CH" dirty="0" err="1">
-                <a:latin typeface="Lucida Sans" pitchFamily="34" charset="0"/>
-              </a:rPr>
-              <a:t>doing</a:t>
-            </a:r>
-            <a:r>
-              <a:rPr lang="de-CH" dirty="0">
-                <a:latin typeface="Lucida Sans" pitchFamily="34" charset="0"/>
-              </a:rPr>
-              <a:t> </a:t>
-            </a:r>
-            <a:endParaRPr lang="de-CH" dirty="0" smtClean="0">
-              <a:latin typeface="Lucida Sans" pitchFamily="34" charset="0"/>
-            </a:endParaRPr>
-          </a:p>
-          <a:p>
-            <a:pPr eaLnBrk="1" hangingPunct="1">
-              <a:buFont typeface="Lucida Grande" charset="0"/>
-              <a:buChar char="▶"/>
-            </a:pPr>
-            <a:r>
-              <a:rPr lang="de-CH" dirty="0" smtClean="0">
-                <a:latin typeface="Lucida Sans" pitchFamily="34" charset="0"/>
-              </a:rPr>
-              <a:t>Zuerst Klassen richtig definieren bevor Datenbank erstellen</a:t>
-            </a:r>
-          </a:p>
-          <a:p>
-            <a:pPr eaLnBrk="1" hangingPunct="1">
-              <a:buFont typeface="Lucida Grande" charset="0"/>
-              <a:buChar char="▶"/>
-            </a:pPr>
-            <a:r>
-              <a:rPr lang="de-CH" dirty="0" smtClean="0">
-                <a:latin typeface="Lucida Sans" pitchFamily="34" charset="0"/>
-              </a:rPr>
-              <a:t>Aufgaben von Anfang an ernst nehmen </a:t>
-            </a:r>
-          </a:p>
-          <a:p>
-            <a:pPr eaLnBrk="1" hangingPunct="1">
-              <a:buFont typeface="Lucida Grande" charset="0"/>
-              <a:buChar char="▶"/>
-            </a:pPr>
-            <a:r>
-              <a:rPr lang="de-CH" dirty="0" smtClean="0">
-                <a:latin typeface="Lucida Sans" pitchFamily="34" charset="0"/>
-              </a:rPr>
-              <a:t>Meetings effizienter gestallten </a:t>
-            </a:r>
-          </a:p>
-          <a:p>
-            <a:pPr eaLnBrk="1" hangingPunct="1">
-              <a:buFont typeface="Lucida Grande" charset="0"/>
-              <a:buChar char="▶"/>
-            </a:pPr>
-            <a:r>
-              <a:rPr lang="de-CH" dirty="0" smtClean="0">
-                <a:latin typeface="Lucida Sans" pitchFamily="34" charset="0"/>
-              </a:rPr>
-              <a:t>Motivation</a:t>
-            </a:r>
-          </a:p>
-          <a:p>
-            <a:pPr eaLnBrk="1" hangingPunct="1">
-              <a:buFont typeface="Lucida Grande" charset="0"/>
-              <a:buChar char="▶"/>
-            </a:pPr>
-            <a:r>
-              <a:rPr lang="de-CH" dirty="0" smtClean="0">
-                <a:latin typeface="Lucida Sans" pitchFamily="34" charset="0"/>
-              </a:rPr>
-              <a:t>Durchhaltevermögen</a:t>
-            </a:r>
-          </a:p>
-          <a:p>
-            <a:pPr eaLnBrk="1" hangingPunct="1">
-              <a:buFont typeface="Lucida Grande" charset="0"/>
-              <a:buChar char="▶"/>
-            </a:pPr>
-            <a:endParaRPr lang="de-CH" dirty="0" smtClean="0">
-              <a:latin typeface="Lucida Sans" pitchFamily="34" charset="0"/>
-            </a:endParaRPr>
-          </a:p>
-          <a:p>
-            <a:pPr eaLnBrk="1" hangingPunct="1">
-              <a:buFont typeface="Lucida Grande" charset="0"/>
-              <a:buChar char="▶"/>
-            </a:pPr>
-            <a:endParaRPr lang="de-CH" dirty="0" smtClean="0">
-              <a:latin typeface="Lucida Sans" pitchFamily="34" charset="0"/>
-            </a:endParaRPr>
-          </a:p>
-          <a:p>
-            <a:pPr eaLnBrk="1" hangingPunct="1">
-              <a:buFont typeface="Lucida Grande" charset="0"/>
-              <a:buChar char="▶"/>
-            </a:pPr>
-            <a:endParaRPr lang="de-CH" dirty="0" smtClean="0">
-              <a:latin typeface="Lucida Sans" pitchFamily="34" charset="0"/>
-            </a:endParaRPr>
-          </a:p>
-          <a:p>
-            <a:pPr marL="0" indent="0" eaLnBrk="1" hangingPunct="1">
-              <a:buNone/>
-            </a:pPr>
-            <a:endParaRPr lang="de-CH" dirty="0">
-              <a:latin typeface="Lucida Sans" pitchFamily="34" charset="0"/>
-            </a:endParaRPr>
-          </a:p>
-          <a:p>
-            <a:pPr marL="0" indent="0" eaLnBrk="1" hangingPunct="1">
-              <a:buNone/>
-            </a:pPr>
-            <a:endParaRPr lang="de-CH" dirty="0">
-              <a:latin typeface="Lucida Sans" pitchFamily="34" charset="0"/>
-            </a:endParaRPr>
-          </a:p>
-        </p:txBody>
-      </p:sp>
-      <p:sp>
-        <p:nvSpPr>
-          <p:cNvPr id="10243" name="Titel 2"/>
-          <p:cNvSpPr>
-            <a:spLocks noGrp="1"/>
-          </p:cNvSpPr>
-          <p:nvPr>
-            <p:ph type="ctrTitle"/>
-          </p:nvPr>
-        </p:nvSpPr>
-        <p:spPr bwMode="auto">
-          <a:xfrm>
-            <a:off x="457200" y="360363"/>
-            <a:ext cx="11249025" cy="539750"/>
-          </a:xfrm>
-          <a:noFill/>
-          <a:extLst>
-            <a:ext uri="{909E8E84-426E-40DD-AFC4-6F175D3DCCD1}">
-              <a14:hiddenFill xmlns:a14="http://schemas.microsoft.com/office/drawing/2010/main">
-                <a:solidFill>
-                  <a:srgbClr val="FFFFFF"/>
-                </a:solidFill>
-              </a14:hiddenFill>
-            </a:ext>
-            <a:ext uri="{91240B29-F687-4F45-9708-019B960494DF}">
-              <a14:hiddenLine xmlns:a14="http://schemas.microsoft.com/office/drawing/2010/main" w="9525">
-                <a:solidFill>
-                  <a:srgbClr val="000000"/>
-                </a:solidFill>
-                <a:miter lim="800000"/>
-                <a:headEnd/>
-                <a:tailEnd/>
-              </a14:hiddenLine>
-            </a:ext>
-          </a:extLst>
-        </p:spPr>
-        <p:txBody>
-          <a:bodyPr vert="horz" wrap="square" tIns="45720" bIns="45720" numCol="1" anchor="t" anchorCtr="0" compatLnSpc="1">
-            <a:prstTxWarp prst="textNoShape">
-              <a:avLst/>
-            </a:prstTxWarp>
-          </a:bodyPr>
-          <a:lstStyle/>
-          <a:p>
-            <a:pPr eaLnBrk="1" hangingPunct="1"/>
-            <a:r>
-              <a:rPr lang="de-CH" dirty="0">
-                <a:latin typeface="Lucida Sans" pitchFamily="34" charset="0"/>
-              </a:rPr>
-              <a:t>Fazit</a:t>
-            </a:r>
-          </a:p>
-        </p:txBody>
-      </p:sp>
-    </p:spTree>
-    <p:extLst>
-      <p:ext uri="{BB962C8B-B14F-4D97-AF65-F5344CB8AC3E}">
-        <p14:creationId xmlns:p14="http://schemas.microsoft.com/office/powerpoint/2010/main" val="718703118"/>
-      </p:ext>
-    </p:extLst>
-  </p:cSld>
-  <p:clrMapOvr>
-    <a:masterClrMapping/>
-  </p:clrMapOvr>
-</p:sld>
-</file>
-
-<file path=ppt/slides/slide6.xml><?xml version="1.0" encoding="utf-8"?>
-<p:sld xmlns:a="http://schemas.openxmlformats.org/drawingml/2006/main" xmlns:r="http://schemas.openxmlformats.org/officeDocument/2006/relationships" xmlns:p="http://schemas.openxmlformats.org/presentationml/2006/main">
-  <p:cSld>
-    <p:spTree>
-      <p:nvGrpSpPr>
-        <p:cNvPr id="1" name=""/>
-        <p:cNvGrpSpPr/>
-        <p:nvPr/>
-      </p:nvGrpSpPr>
-      <p:grpSpPr>
-        <a:xfrm>
-          <a:off x="0" y="0"/>
-          <a:ext cx="0" cy="0"/>
-          <a:chOff x="0" y="0"/>
-          <a:chExt cx="0" cy="0"/>
-        </a:xfrm>
-      </p:grpSpPr>
-      <p:sp>
-        <p:nvSpPr>
-          <p:cNvPr id="8194" name="Titel 1"/>
-          <p:cNvSpPr>
-            <a:spLocks noGrp="1"/>
-          </p:cNvSpPr>
-          <p:nvPr>
-            <p:ph type="ctrTitle"/>
-          </p:nvPr>
-        </p:nvSpPr>
-        <p:spPr bwMode="auto">
-          <a:xfrm>
-            <a:off x="457200" y="1839913"/>
-            <a:ext cx="7019925" cy="533400"/>
-          </a:xfrm>
-          <a:noFill/>
-          <a:extLst>
-            <a:ext uri="{909E8E84-426E-40DD-AFC4-6F175D3DCCD1}">
-              <a14:hiddenFill xmlns:a14="http://schemas.microsoft.com/office/drawing/2010/main">
-                <a:solidFill>
-                  <a:srgbClr val="FFFFFF"/>
-                </a:solidFill>
-              </a14:hiddenFill>
-            </a:ext>
-            <a:ext uri="{91240B29-F687-4F45-9708-019B960494DF}">
-              <a14:hiddenLine xmlns:a14="http://schemas.microsoft.com/office/drawing/2010/main" w="9525">
-                <a:solidFill>
-                  <a:srgbClr val="000000"/>
-                </a:solidFill>
-                <a:miter lim="800000"/>
-                <a:headEnd/>
-                <a:tailEnd/>
-              </a14:hiddenLine>
-            </a:ext>
-          </a:extLst>
-        </p:spPr>
-        <p:txBody>
-          <a:bodyPr vert="horz" wrap="square" tIns="45720" bIns="45720" numCol="1" anchor="t" anchorCtr="0" compatLnSpc="1">
-            <a:prstTxWarp prst="textNoShape">
-              <a:avLst/>
-            </a:prstTxWarp>
-          </a:bodyPr>
-          <a:lstStyle/>
-          <a:p>
-            <a:pPr eaLnBrk="1" hangingPunct="1"/>
-            <a:r>
-              <a:rPr lang="de-CH" dirty="0">
-                <a:latin typeface="Lucida Sans" pitchFamily="34" charset="0"/>
-                <a:cs typeface="Lucida Sans Unicode" pitchFamily="34" charset="0"/>
-              </a:rPr>
-              <a:t>Danke für Ihre Aufmerksamkeit</a:t>
-            </a:r>
-          </a:p>
-        </p:txBody>
-      </p:sp>
-      <p:sp>
-        <p:nvSpPr>
-          <p:cNvPr id="8195" name="Untertitel 2"/>
-          <p:cNvSpPr>
-            <a:spLocks noGrp="1"/>
-          </p:cNvSpPr>
-          <p:nvPr>
-            <p:ph type="subTitle" idx="1"/>
-          </p:nvPr>
-        </p:nvSpPr>
-        <p:spPr bwMode="auto">
-          <a:xfrm>
-            <a:off x="457200" y="2447925"/>
-            <a:ext cx="7019925" cy="804863"/>
-          </a:xfrm>
-          <a:noFill/>
-          <a:extLst>
-            <a:ext uri="{909E8E84-426E-40DD-AFC4-6F175D3DCCD1}">
-              <a14:hiddenFill xmlns:a14="http://schemas.microsoft.com/office/drawing/2010/main">
-                <a:solidFill>
-                  <a:srgbClr val="FFFFFF"/>
-                </a:solidFill>
-              </a14:hiddenFill>
-            </a:ext>
-            <a:ext uri="{91240B29-F687-4F45-9708-019B960494DF}">
-              <a14:hiddenLine xmlns:a14="http://schemas.microsoft.com/office/drawing/2010/main" w="9525">
-                <a:solidFill>
-                  <a:srgbClr val="000000"/>
-                </a:solidFill>
-                <a:miter lim="800000"/>
-                <a:headEnd/>
-                <a:tailEnd/>
-              </a14:hiddenLine>
-            </a:ext>
-          </a:extLst>
-        </p:spPr>
-        <p:txBody>
-          <a:bodyPr vert="horz" wrap="square" tIns="45720" rIns="91440" bIns="45720" numCol="1" anchor="t" anchorCtr="0" compatLnSpc="1">
-            <a:prstTxWarp prst="textNoShape">
-              <a:avLst/>
-            </a:prstTxWarp>
-          </a:bodyPr>
-          <a:lstStyle/>
-          <a:p>
-            <a:pPr eaLnBrk="1" hangingPunct="1"/>
-            <a:endParaRPr lang="de-CH">
-              <a:latin typeface="Lucida Sans" pitchFamily="34" charset="0"/>
-              <a:cs typeface="Lucida Sans Unicode" pitchFamily="34" charset="0"/>
-            </a:endParaRPr>
           </a:p>
         </p:txBody>
       </p:sp>
@@ -8712,15 +9299,6 @@
 </file>
 
 <file path=customXml/item1.xml><?xml version="1.0" encoding="utf-8"?>
-<?mso-contentType ?>
-<FormTemplates xmlns="http://schemas.microsoft.com/sharepoint/v3/contenttype/forms">
-  <Display>DocumentLibraryForm</Display>
-  <Edit>DocumentLibraryForm</Edit>
-  <New>DocumentLibraryForm</New>
-</FormTemplates>
-</file>
-
-<file path=customXml/item2.xml><?xml version="1.0" encoding="utf-8"?>
 <ct:contentTypeSchema xmlns:ct="http://schemas.microsoft.com/office/2006/metadata/contentType" xmlns:ma="http://schemas.microsoft.com/office/2006/metadata/properties/metaAttributes" ct:_="" ma:_="" ma:contentTypeName="Dokument" ma:contentTypeID="0x0101003A4279409C3118409D418E682AEFAFB0" ma:contentTypeVersion="3" ma:contentTypeDescription="Ein neues Dokument erstellen." ma:contentTypeScope="" ma:versionID="101028ed2a8124309b77afe37cae3487">
   <xsd:schema xmlns:xsd="http://www.w3.org/2001/XMLSchema" xmlns:p="http://schemas.microsoft.com/office/2006/metadata/properties" xmlns:ns2="238ac175-5152-443e-bf42-417a27926292" targetNamespace="http://schemas.microsoft.com/office/2006/metadata/properties" ma:root="true" ma:fieldsID="20db5ee339a7a41ccd05188cc98320bc" ns2:_="">
     <xsd:import namespace="238ac175-5152-443e-bf42-417a27926292"/>
@@ -8806,6 +9384,15 @@
 </ct:contentTypeSchema>
 </file>
 
+<file path=customXml/item2.xml><?xml version="1.0" encoding="utf-8"?>
+<?mso-contentType ?>
+<FormTemplates xmlns="http://schemas.microsoft.com/sharepoint/v3/contenttype/forms">
+  <Display>DocumentLibraryForm</Display>
+  <Edit>DocumentLibraryForm</Edit>
+  <New>DocumentLibraryForm</New>
+</FormTemplates>
+</file>
+
 <file path=customXml/item3.xml><?xml version="1.0" encoding="utf-8"?>
 <p:properties xmlns:p="http://schemas.microsoft.com/office/2006/metadata/properties" xmlns:xsi="http://www.w3.org/2001/XMLSchema-instance">
   <documentManagement>
@@ -8817,14 +9404,6 @@
 </file>
 
 <file path=customXml/itemProps1.xml><?xml version="1.0" encoding="utf-8"?>
-<ds:datastoreItem xmlns:ds="http://schemas.openxmlformats.org/officeDocument/2006/customXml" ds:itemID="{9CE40E7B-A2C7-4778-9F2A-6D23000DC7D5}">
-  <ds:schemaRefs>
-    <ds:schemaRef ds:uri="http://schemas.microsoft.com/sharepoint/v3/contenttype/forms"/>
-  </ds:schemaRefs>
-</ds:datastoreItem>
-</file>
-
-<file path=customXml/itemProps2.xml><?xml version="1.0" encoding="utf-8"?>
 <ds:datastoreItem xmlns:ds="http://schemas.openxmlformats.org/officeDocument/2006/customXml" ds:itemID="{277F83F2-8BF7-47B6-B01C-8F4E00C9C994}">
   <ds:schemaRefs>
     <ds:schemaRef ds:uri="http://schemas.microsoft.com/office/2006/metadata/contentType"/>
@@ -8837,6 +9416,14 @@
     <ds:schemaRef ds:uri="http://purl.org/dc/elements/1.1/"/>
     <ds:schemaRef ds:uri="http://purl.org/dc/terms/"/>
     <ds:schemaRef ds:uri="http://schemas.microsoft.com/office/internal/2005/internalDocumentation"/>
+  </ds:schemaRefs>
+</ds:datastoreItem>
+</file>
+
+<file path=customXml/itemProps2.xml><?xml version="1.0" encoding="utf-8"?>
+<ds:datastoreItem xmlns:ds="http://schemas.openxmlformats.org/officeDocument/2006/customXml" ds:itemID="{9CE40E7B-A2C7-4778-9F2A-6D23000DC7D5}">
+  <ds:schemaRefs>
+    <ds:schemaRef ds:uri="http://schemas.microsoft.com/sharepoint/v3/contenttype/forms"/>
   </ds:schemaRefs>
 </ds:datastoreItem>
 </file>

</xml_diff>